<commit_message>
Added link to slides in presentation
</commit_message>
<xml_diff>
--- a/Documentation/Presentations/20170504_LightningTalk.pptx
+++ b/Documentation/Presentations/20170504_LightningTalk.pptx
@@ -111,6 +111,11 @@
       </a:defRPr>
     </a:lvl9pPr>
   </p:defaultTextStyle>
+  <p:extLst>
+    <p:ext uri="{EFAFB233-063F-42B5-8137-9DF3F51BA10A}">
+      <p15:sldGuideLst xmlns:p15="http://schemas.microsoft.com/office/powerpoint/2012/main"/>
+    </p:ext>
+  </p:extLst>
 </p:presentation>
 </file>
 
@@ -598,7 +603,7 @@
           <a:noFill/>
           <a:extLst>
             <a:ext uri="{909E8E84-426E-40dd-AFC4-6F175D3DCCD1}">
-              <a14:hiddenFill xmlns:a14="http://schemas.microsoft.com/office/drawing/2010/main" xmlns="">
+              <a14:hiddenFill xmlns="" xmlns:a14="http://schemas.microsoft.com/office/drawing/2010/main">
                 <a:solidFill>
                   <a:srgbClr val="FFFFFF"/>
                 </a:solidFill>
@@ -658,7 +663,7 @@
             </a:ln>
             <a:extLst>
               <a:ext uri="{91240B29-F687-4f45-9708-019B960494DF}">
-                <a14:hiddenLine xmlns:a14="http://schemas.microsoft.com/office/drawing/2010/main" xmlns="" w="9525">
+                <a14:hiddenLine xmlns="" xmlns:a14="http://schemas.microsoft.com/office/drawing/2010/main" w="9525">
                   <a:solidFill>
                     <a:srgbClr val="000000"/>
                   </a:solidFill>
@@ -748,7 +753,7 @@
             </a:ln>
             <a:extLst>
               <a:ext uri="{91240B29-F687-4f45-9708-019B960494DF}">
-                <a14:hiddenLine xmlns:a14="http://schemas.microsoft.com/office/drawing/2010/main" xmlns="" w="9525">
+                <a14:hiddenLine xmlns="" xmlns:a14="http://schemas.microsoft.com/office/drawing/2010/main" w="9525">
                   <a:solidFill>
                     <a:srgbClr val="000000"/>
                   </a:solidFill>
@@ -838,7 +843,7 @@
             </a:ln>
             <a:extLst>
               <a:ext uri="{91240B29-F687-4f45-9708-019B960494DF}">
-                <a14:hiddenLine xmlns:a14="http://schemas.microsoft.com/office/drawing/2010/main" xmlns="" w="9525">
+                <a14:hiddenLine xmlns="" xmlns:a14="http://schemas.microsoft.com/office/drawing/2010/main" w="9525">
                   <a:solidFill>
                     <a:srgbClr val="000000"/>
                   </a:solidFill>
@@ -872,7 +877,7 @@
             </a:ln>
             <a:extLst>
               <a:ext uri="{91240B29-F687-4f45-9708-019B960494DF}">
-                <a14:hiddenLine xmlns:a14="http://schemas.microsoft.com/office/drawing/2010/main" xmlns="" w="9525">
+                <a14:hiddenLine xmlns="" xmlns:a14="http://schemas.microsoft.com/office/drawing/2010/main" w="9525">
                   <a:solidFill>
                     <a:srgbClr val="000000"/>
                   </a:solidFill>
@@ -962,7 +967,7 @@
             </a:ln>
             <a:extLst>
               <a:ext uri="{91240B29-F687-4f45-9708-019B960494DF}">
-                <a14:hiddenLine xmlns:a14="http://schemas.microsoft.com/office/drawing/2010/main" xmlns="" w="9525">
+                <a14:hiddenLine xmlns="" xmlns:a14="http://schemas.microsoft.com/office/drawing/2010/main" w="9525">
                   <a:solidFill>
                     <a:srgbClr val="000000"/>
                   </a:solidFill>
@@ -1024,7 +1029,7 @@
             </a:ln>
             <a:extLst>
               <a:ext uri="{91240B29-F687-4f45-9708-019B960494DF}">
-                <a14:hiddenLine xmlns:a14="http://schemas.microsoft.com/office/drawing/2010/main" xmlns="" w="9525">
+                <a14:hiddenLine xmlns="" xmlns:a14="http://schemas.microsoft.com/office/drawing/2010/main" w="9525">
                   <a:solidFill>
                     <a:srgbClr val="000000"/>
                   </a:solidFill>
@@ -1086,7 +1091,7 @@
             </a:ln>
             <a:extLst>
               <a:ext uri="{91240B29-F687-4f45-9708-019B960494DF}">
-                <a14:hiddenLine xmlns:a14="http://schemas.microsoft.com/office/drawing/2010/main" xmlns="" w="9525">
+                <a14:hiddenLine xmlns="" xmlns:a14="http://schemas.microsoft.com/office/drawing/2010/main" w="9525">
                   <a:solidFill>
                     <a:srgbClr val="000000"/>
                   </a:solidFill>
@@ -1176,7 +1181,7 @@
             </a:ln>
             <a:extLst>
               <a:ext uri="{91240B29-F687-4f45-9708-019B960494DF}">
-                <a14:hiddenLine xmlns:a14="http://schemas.microsoft.com/office/drawing/2010/main" xmlns="" w="9525">
+                <a14:hiddenLine xmlns="" xmlns:a14="http://schemas.microsoft.com/office/drawing/2010/main" w="9525">
                   <a:solidFill>
                     <a:srgbClr val="000000"/>
                   </a:solidFill>
@@ -1238,7 +1243,7 @@
             </a:ln>
             <a:extLst>
               <a:ext uri="{91240B29-F687-4f45-9708-019B960494DF}">
-                <a14:hiddenLine xmlns:a14="http://schemas.microsoft.com/office/drawing/2010/main" xmlns="" w="9525">
+                <a14:hiddenLine xmlns="" xmlns:a14="http://schemas.microsoft.com/office/drawing/2010/main" w="9525">
                   <a:solidFill>
                     <a:srgbClr val="000000"/>
                   </a:solidFill>
@@ -1300,7 +1305,7 @@
             </a:ln>
             <a:extLst>
               <a:ext uri="{91240B29-F687-4f45-9708-019B960494DF}">
-                <a14:hiddenLine xmlns:a14="http://schemas.microsoft.com/office/drawing/2010/main" xmlns="" w="9525">
+                <a14:hiddenLine xmlns="" xmlns:a14="http://schemas.microsoft.com/office/drawing/2010/main" w="9525">
                   <a:solidFill>
                     <a:srgbClr val="000000"/>
                   </a:solidFill>
@@ -1390,7 +1395,7 @@
             </a:ln>
             <a:extLst>
               <a:ext uri="{91240B29-F687-4f45-9708-019B960494DF}">
-                <a14:hiddenLine xmlns:a14="http://schemas.microsoft.com/office/drawing/2010/main" xmlns="" w="9525">
+                <a14:hiddenLine xmlns="" xmlns:a14="http://schemas.microsoft.com/office/drawing/2010/main" w="9525">
                   <a:solidFill>
                     <a:srgbClr val="000000"/>
                   </a:solidFill>
@@ -1480,7 +1485,7 @@
             </a:ln>
             <a:extLst>
               <a:ext uri="{91240B29-F687-4f45-9708-019B960494DF}">
-                <a14:hiddenLine xmlns:a14="http://schemas.microsoft.com/office/drawing/2010/main" xmlns="" w="9525">
+                <a14:hiddenLine xmlns="" xmlns:a14="http://schemas.microsoft.com/office/drawing/2010/main" w="9525">
                   <a:solidFill>
                     <a:srgbClr val="000000"/>
                   </a:solidFill>
@@ -1542,7 +1547,7 @@
             </a:ln>
             <a:extLst>
               <a:ext uri="{91240B29-F687-4f45-9708-019B960494DF}">
-                <a14:hiddenLine xmlns:a14="http://schemas.microsoft.com/office/drawing/2010/main" xmlns="" w="9525">
+                <a14:hiddenLine xmlns="" xmlns:a14="http://schemas.microsoft.com/office/drawing/2010/main" w="9525">
                   <a:solidFill>
                     <a:srgbClr val="000000"/>
                   </a:solidFill>
@@ -1652,7 +1657,7 @@
             </a:ln>
             <a:extLst>
               <a:ext uri="{91240B29-F687-4f45-9708-019B960494DF}">
-                <a14:hiddenLine xmlns:a14="http://schemas.microsoft.com/office/drawing/2010/main" xmlns="" w="9525">
+                <a14:hiddenLine xmlns="" xmlns:a14="http://schemas.microsoft.com/office/drawing/2010/main" w="9525">
                   <a:solidFill>
                     <a:srgbClr val="000000"/>
                   </a:solidFill>
@@ -1714,7 +1719,7 @@
             </a:ln>
             <a:extLst>
               <a:ext uri="{91240B29-F687-4f45-9708-019B960494DF}">
-                <a14:hiddenLine xmlns:a14="http://schemas.microsoft.com/office/drawing/2010/main" xmlns="" w="9525">
+                <a14:hiddenLine xmlns="" xmlns:a14="http://schemas.microsoft.com/office/drawing/2010/main" w="9525">
                   <a:solidFill>
                     <a:srgbClr val="000000"/>
                   </a:solidFill>
@@ -1804,7 +1809,7 @@
             </a:ln>
             <a:extLst>
               <a:ext uri="{91240B29-F687-4f45-9708-019B960494DF}">
-                <a14:hiddenLine xmlns:a14="http://schemas.microsoft.com/office/drawing/2010/main" xmlns="" w="9525">
+                <a14:hiddenLine xmlns="" xmlns:a14="http://schemas.microsoft.com/office/drawing/2010/main" w="9525">
                   <a:solidFill>
                     <a:srgbClr val="000000"/>
                   </a:solidFill>
@@ -1894,7 +1899,7 @@
             </a:ln>
             <a:extLst>
               <a:ext uri="{91240B29-F687-4f45-9708-019B960494DF}">
-                <a14:hiddenLine xmlns:a14="http://schemas.microsoft.com/office/drawing/2010/main" xmlns="" w="9525">
+                <a14:hiddenLine xmlns="" xmlns:a14="http://schemas.microsoft.com/office/drawing/2010/main" w="9525">
                   <a:solidFill>
                     <a:srgbClr val="000000"/>
                   </a:solidFill>
@@ -1956,7 +1961,7 @@
             </a:ln>
             <a:extLst>
               <a:ext uri="{91240B29-F687-4f45-9708-019B960494DF}">
-                <a14:hiddenLine xmlns:a14="http://schemas.microsoft.com/office/drawing/2010/main" xmlns="" w="9525">
+                <a14:hiddenLine xmlns="" xmlns:a14="http://schemas.microsoft.com/office/drawing/2010/main" w="9525">
                   <a:solidFill>
                     <a:srgbClr val="000000"/>
                   </a:solidFill>
@@ -2046,7 +2051,7 @@
             </a:ln>
             <a:extLst>
               <a:ext uri="{91240B29-F687-4f45-9708-019B960494DF}">
-                <a14:hiddenLine xmlns:a14="http://schemas.microsoft.com/office/drawing/2010/main" xmlns="" w="9525">
+                <a14:hiddenLine xmlns="" xmlns:a14="http://schemas.microsoft.com/office/drawing/2010/main" w="9525">
                   <a:solidFill>
                     <a:srgbClr val="000000"/>
                   </a:solidFill>
@@ -2136,7 +2141,7 @@
             </a:ln>
             <a:extLst>
               <a:ext uri="{91240B29-F687-4f45-9708-019B960494DF}">
-                <a14:hiddenLine xmlns:a14="http://schemas.microsoft.com/office/drawing/2010/main" xmlns="" w="9525">
+                <a14:hiddenLine xmlns="" xmlns:a14="http://schemas.microsoft.com/office/drawing/2010/main" w="9525">
                   <a:solidFill>
                     <a:srgbClr val="000000"/>
                   </a:solidFill>
@@ -2192,7 +2197,7 @@
             </a:ln>
             <a:extLst>
               <a:ext uri="{91240B29-F687-4f45-9708-019B960494DF}">
-                <a14:hiddenLine xmlns:a14="http://schemas.microsoft.com/office/drawing/2010/main" xmlns="" w="9525">
+                <a14:hiddenLine xmlns="" xmlns:a14="http://schemas.microsoft.com/office/drawing/2010/main" w="9525">
                   <a:solidFill>
                     <a:srgbClr val="000000"/>
                   </a:solidFill>
@@ -2282,7 +2287,7 @@
             </a:ln>
             <a:extLst>
               <a:ext uri="{91240B29-F687-4f45-9708-019B960494DF}">
-                <a14:hiddenLine xmlns:a14="http://schemas.microsoft.com/office/drawing/2010/main" xmlns="" w="9525">
+                <a14:hiddenLine xmlns="" xmlns:a14="http://schemas.microsoft.com/office/drawing/2010/main" w="9525">
                   <a:solidFill>
                     <a:srgbClr val="000000"/>
                   </a:solidFill>
@@ -2338,7 +2343,7 @@
             </a:ln>
             <a:extLst>
               <a:ext uri="{91240B29-F687-4f45-9708-019B960494DF}">
-                <a14:hiddenLine xmlns:a14="http://schemas.microsoft.com/office/drawing/2010/main" xmlns="" w="9525">
+                <a14:hiddenLine xmlns="" xmlns:a14="http://schemas.microsoft.com/office/drawing/2010/main" w="9525">
                   <a:solidFill>
                     <a:srgbClr val="000000"/>
                   </a:solidFill>
@@ -2428,7 +2433,7 @@
             </a:ln>
             <a:extLst>
               <a:ext uri="{91240B29-F687-4f45-9708-019B960494DF}">
-                <a14:hiddenLine xmlns:a14="http://schemas.microsoft.com/office/drawing/2010/main" xmlns="" w="9525">
+                <a14:hiddenLine xmlns="" xmlns:a14="http://schemas.microsoft.com/office/drawing/2010/main" w="9525">
                   <a:solidFill>
                     <a:srgbClr val="000000"/>
                   </a:solidFill>
@@ -2496,7 +2501,7 @@
             </a:ln>
             <a:extLst>
               <a:ext uri="{91240B29-F687-4f45-9708-019B960494DF}">
-                <a14:hiddenLine xmlns:a14="http://schemas.microsoft.com/office/drawing/2010/main" xmlns="" w="9525">
+                <a14:hiddenLine xmlns="" xmlns:a14="http://schemas.microsoft.com/office/drawing/2010/main" w="9525">
                   <a:solidFill>
                     <a:srgbClr val="000000"/>
                   </a:solidFill>
@@ -2586,7 +2591,7 @@
             </a:ln>
             <a:extLst>
               <a:ext uri="{91240B29-F687-4f45-9708-019B960494DF}">
-                <a14:hiddenLine xmlns:a14="http://schemas.microsoft.com/office/drawing/2010/main" xmlns="" w="9525">
+                <a14:hiddenLine xmlns="" xmlns:a14="http://schemas.microsoft.com/office/drawing/2010/main" w="9525">
                   <a:solidFill>
                     <a:srgbClr val="000000"/>
                   </a:solidFill>
@@ -2654,7 +2659,7 @@
             </a:ln>
             <a:extLst>
               <a:ext uri="{91240B29-F687-4f45-9708-019B960494DF}">
-                <a14:hiddenLine xmlns:a14="http://schemas.microsoft.com/office/drawing/2010/main" xmlns="" w="9525">
+                <a14:hiddenLine xmlns="" xmlns:a14="http://schemas.microsoft.com/office/drawing/2010/main" w="9525">
                   <a:solidFill>
                     <a:srgbClr val="000000"/>
                   </a:solidFill>
@@ -2744,7 +2749,7 @@
             </a:ln>
             <a:extLst>
               <a:ext uri="{91240B29-F687-4f45-9708-019B960494DF}">
-                <a14:hiddenLine xmlns:a14="http://schemas.microsoft.com/office/drawing/2010/main" xmlns="" w="9525">
+                <a14:hiddenLine xmlns="" xmlns:a14="http://schemas.microsoft.com/office/drawing/2010/main" w="9525">
                   <a:solidFill>
                     <a:srgbClr val="000000"/>
                   </a:solidFill>
@@ -2778,7 +2783,7 @@
             </a:ln>
             <a:extLst>
               <a:ext uri="{91240B29-F687-4f45-9708-019B960494DF}">
-                <a14:hiddenLine xmlns:a14="http://schemas.microsoft.com/office/drawing/2010/main" xmlns="" w="9525">
+                <a14:hiddenLine xmlns="" xmlns:a14="http://schemas.microsoft.com/office/drawing/2010/main" w="9525">
                   <a:solidFill>
                     <a:srgbClr val="000000"/>
                   </a:solidFill>
@@ -2868,7 +2873,7 @@
             </a:ln>
             <a:extLst>
               <a:ext uri="{91240B29-F687-4f45-9708-019B960494DF}">
-                <a14:hiddenLine xmlns:a14="http://schemas.microsoft.com/office/drawing/2010/main" xmlns="" w="9525">
+                <a14:hiddenLine xmlns="" xmlns:a14="http://schemas.microsoft.com/office/drawing/2010/main" w="9525">
                   <a:solidFill>
                     <a:srgbClr val="000000"/>
                   </a:solidFill>
@@ -2930,7 +2935,7 @@
             </a:ln>
             <a:extLst>
               <a:ext uri="{91240B29-F687-4f45-9708-019B960494DF}">
-                <a14:hiddenLine xmlns:a14="http://schemas.microsoft.com/office/drawing/2010/main" xmlns="" w="9525">
+                <a14:hiddenLine xmlns="" xmlns:a14="http://schemas.microsoft.com/office/drawing/2010/main" w="9525">
                   <a:solidFill>
                     <a:srgbClr val="000000"/>
                   </a:solidFill>
@@ -2992,7 +2997,7 @@
             </a:ln>
             <a:extLst>
               <a:ext uri="{91240B29-F687-4f45-9708-019B960494DF}">
-                <a14:hiddenLine xmlns:a14="http://schemas.microsoft.com/office/drawing/2010/main" xmlns="" w="9525">
+                <a14:hiddenLine xmlns="" xmlns:a14="http://schemas.microsoft.com/office/drawing/2010/main" w="9525">
                   <a:solidFill>
                     <a:srgbClr val="000000"/>
                   </a:solidFill>
@@ -3082,7 +3087,7 @@
             </a:ln>
             <a:extLst>
               <a:ext uri="{91240B29-F687-4f45-9708-019B960494DF}">
-                <a14:hiddenLine xmlns:a14="http://schemas.microsoft.com/office/drawing/2010/main" xmlns="" w="9525">
+                <a14:hiddenLine xmlns="" xmlns:a14="http://schemas.microsoft.com/office/drawing/2010/main" w="9525">
                   <a:solidFill>
                     <a:srgbClr val="000000"/>
                   </a:solidFill>
@@ -3150,7 +3155,7 @@
             </a:ln>
             <a:extLst>
               <a:ext uri="{91240B29-F687-4f45-9708-019B960494DF}">
-                <a14:hiddenLine xmlns:a14="http://schemas.microsoft.com/office/drawing/2010/main" xmlns="" w="9525">
+                <a14:hiddenLine xmlns="" xmlns:a14="http://schemas.microsoft.com/office/drawing/2010/main" w="9525">
                   <a:solidFill>
                     <a:srgbClr val="000000"/>
                   </a:solidFill>
@@ -3212,7 +3217,7 @@
             </a:ln>
             <a:extLst>
               <a:ext uri="{91240B29-F687-4f45-9708-019B960494DF}">
-                <a14:hiddenLine xmlns:a14="http://schemas.microsoft.com/office/drawing/2010/main" xmlns="" w="9525">
+                <a14:hiddenLine xmlns="" xmlns:a14="http://schemas.microsoft.com/office/drawing/2010/main" w="9525">
                   <a:solidFill>
                     <a:srgbClr val="000000"/>
                   </a:solidFill>
@@ -3302,7 +3307,7 @@
             </a:ln>
             <a:extLst>
               <a:ext uri="{91240B29-F687-4f45-9708-019B960494DF}">
-                <a14:hiddenLine xmlns:a14="http://schemas.microsoft.com/office/drawing/2010/main" xmlns="" w="9525">
+                <a14:hiddenLine xmlns="" xmlns:a14="http://schemas.microsoft.com/office/drawing/2010/main" w="9525">
                   <a:solidFill>
                     <a:srgbClr val="000000"/>
                   </a:solidFill>
@@ -3364,7 +3369,7 @@
             </a:ln>
             <a:extLst>
               <a:ext uri="{91240B29-F687-4f45-9708-019B960494DF}">
-                <a14:hiddenLine xmlns:a14="http://schemas.microsoft.com/office/drawing/2010/main" xmlns="" w="9525">
+                <a14:hiddenLine xmlns="" xmlns:a14="http://schemas.microsoft.com/office/drawing/2010/main" w="9525">
                   <a:solidFill>
                     <a:srgbClr val="000000"/>
                   </a:solidFill>
@@ -3454,7 +3459,7 @@
             </a:ln>
             <a:extLst>
               <a:ext uri="{91240B29-F687-4f45-9708-019B960494DF}">
-                <a14:hiddenLine xmlns:a14="http://schemas.microsoft.com/office/drawing/2010/main" xmlns="" w="9525">
+                <a14:hiddenLine xmlns="" xmlns:a14="http://schemas.microsoft.com/office/drawing/2010/main" w="9525">
                   <a:solidFill>
                     <a:srgbClr val="000000"/>
                   </a:solidFill>
@@ -3516,7 +3521,7 @@
             </a:ln>
             <a:extLst>
               <a:ext uri="{91240B29-F687-4f45-9708-019B960494DF}">
-                <a14:hiddenLine xmlns:a14="http://schemas.microsoft.com/office/drawing/2010/main" xmlns="" w="9525">
+                <a14:hiddenLine xmlns="" xmlns:a14="http://schemas.microsoft.com/office/drawing/2010/main" w="9525">
                   <a:solidFill>
                     <a:srgbClr val="000000"/>
                   </a:solidFill>
@@ -3606,7 +3611,7 @@
             </a:ln>
             <a:extLst>
               <a:ext uri="{91240B29-F687-4f45-9708-019B960494DF}">
-                <a14:hiddenLine xmlns:a14="http://schemas.microsoft.com/office/drawing/2010/main" xmlns="" w="9525">
+                <a14:hiddenLine xmlns="" xmlns:a14="http://schemas.microsoft.com/office/drawing/2010/main" w="9525">
                   <a:solidFill>
                     <a:srgbClr val="000000"/>
                   </a:solidFill>
@@ -3640,7 +3645,7 @@
             </a:ln>
             <a:extLst>
               <a:ext uri="{91240B29-F687-4f45-9708-019B960494DF}">
-                <a14:hiddenLine xmlns:a14="http://schemas.microsoft.com/office/drawing/2010/main" xmlns="" w="9525">
+                <a14:hiddenLine xmlns="" xmlns:a14="http://schemas.microsoft.com/office/drawing/2010/main" w="9525">
                   <a:solidFill>
                     <a:srgbClr val="000000"/>
                   </a:solidFill>
@@ -3705,7 +3710,7 @@
             </a:ln>
             <a:extLst>
               <a:ext uri="{91240B29-F687-4f45-9708-019B960494DF}">
-                <a14:hiddenLine xmlns:a14="http://schemas.microsoft.com/office/drawing/2010/main" xmlns="" w="9525">
+                <a14:hiddenLine xmlns="" xmlns:a14="http://schemas.microsoft.com/office/drawing/2010/main" w="9525">
                   <a:solidFill>
                     <a:srgbClr val="000000"/>
                   </a:solidFill>
@@ -3795,7 +3800,7 @@
             </a:ln>
             <a:extLst>
               <a:ext uri="{91240B29-F687-4f45-9708-019B960494DF}">
-                <a14:hiddenLine xmlns:a14="http://schemas.microsoft.com/office/drawing/2010/main" xmlns="" w="9525">
+                <a14:hiddenLine xmlns="" xmlns:a14="http://schemas.microsoft.com/office/drawing/2010/main" w="9525">
                   <a:solidFill>
                     <a:srgbClr val="000000"/>
                   </a:solidFill>
@@ -3857,7 +3862,7 @@
             </a:ln>
             <a:extLst>
               <a:ext uri="{91240B29-F687-4f45-9708-019B960494DF}">
-                <a14:hiddenLine xmlns:a14="http://schemas.microsoft.com/office/drawing/2010/main" xmlns="" w="9525">
+                <a14:hiddenLine xmlns="" xmlns:a14="http://schemas.microsoft.com/office/drawing/2010/main" w="9525">
                   <a:solidFill>
                     <a:srgbClr val="000000"/>
                   </a:solidFill>
@@ -3947,7 +3952,7 @@
             </a:ln>
             <a:extLst>
               <a:ext uri="{91240B29-F687-4f45-9708-019B960494DF}">
-                <a14:hiddenLine xmlns:a14="http://schemas.microsoft.com/office/drawing/2010/main" xmlns="" w="9525">
+                <a14:hiddenLine xmlns="" xmlns:a14="http://schemas.microsoft.com/office/drawing/2010/main" w="9525">
                   <a:solidFill>
                     <a:srgbClr val="000000"/>
                   </a:solidFill>
@@ -4037,7 +4042,7 @@
             </a:ln>
             <a:extLst>
               <a:ext uri="{91240B29-F687-4f45-9708-019B960494DF}">
-                <a14:hiddenLine xmlns:a14="http://schemas.microsoft.com/office/drawing/2010/main" xmlns="" w="9525">
+                <a14:hiddenLine xmlns="" xmlns:a14="http://schemas.microsoft.com/office/drawing/2010/main" w="9525">
                   <a:solidFill>
                     <a:srgbClr val="000000"/>
                   </a:solidFill>
@@ -4102,7 +4107,7 @@
             </a:ln>
             <a:extLst>
               <a:ext uri="{91240B29-F687-4f45-9708-019B960494DF}">
-                <a14:hiddenLine xmlns:a14="http://schemas.microsoft.com/office/drawing/2010/main" xmlns="" w="9525">
+                <a14:hiddenLine xmlns="" xmlns:a14="http://schemas.microsoft.com/office/drawing/2010/main" w="9525">
                   <a:solidFill>
                     <a:srgbClr val="000000"/>
                   </a:solidFill>
@@ -4164,7 +4169,7 @@
             </a:ln>
             <a:extLst>
               <a:ext uri="{91240B29-F687-4f45-9708-019B960494DF}">
-                <a14:hiddenLine xmlns:a14="http://schemas.microsoft.com/office/drawing/2010/main" xmlns="" w="9525">
+                <a14:hiddenLine xmlns="" xmlns:a14="http://schemas.microsoft.com/office/drawing/2010/main" w="9525">
                   <a:solidFill>
                     <a:srgbClr val="000000"/>
                   </a:solidFill>
@@ -4254,7 +4259,7 @@
             </a:ln>
             <a:extLst>
               <a:ext uri="{91240B29-F687-4f45-9708-019B960494DF}">
-                <a14:hiddenLine xmlns:a14="http://schemas.microsoft.com/office/drawing/2010/main" xmlns="" w="9525">
+                <a14:hiddenLine xmlns="" xmlns:a14="http://schemas.microsoft.com/office/drawing/2010/main" w="9525">
                   <a:solidFill>
                     <a:srgbClr val="000000"/>
                   </a:solidFill>
@@ -4344,7 +4349,7 @@
             </a:ln>
             <a:extLst>
               <a:ext uri="{91240B29-F687-4f45-9708-019B960494DF}">
-                <a14:hiddenLine xmlns:a14="http://schemas.microsoft.com/office/drawing/2010/main" xmlns="" w="9525">
+                <a14:hiddenLine xmlns="" xmlns:a14="http://schemas.microsoft.com/office/drawing/2010/main" w="9525">
                   <a:solidFill>
                     <a:srgbClr val="000000"/>
                   </a:solidFill>
@@ -4406,7 +4411,7 @@
             </a:ln>
             <a:extLst>
               <a:ext uri="{91240B29-F687-4f45-9708-019B960494DF}">
-                <a14:hiddenLine xmlns:a14="http://schemas.microsoft.com/office/drawing/2010/main" xmlns="" w="9525">
+                <a14:hiddenLine xmlns="" xmlns:a14="http://schemas.microsoft.com/office/drawing/2010/main" w="9525">
                   <a:solidFill>
                     <a:srgbClr val="000000"/>
                   </a:solidFill>
@@ -4526,7 +4531,7 @@
             </a:ln>
             <a:extLst>
               <a:ext uri="{91240B29-F687-4f45-9708-019B960494DF}">
-                <a14:hiddenLine xmlns:a14="http://schemas.microsoft.com/office/drawing/2010/main" xmlns="" w="9525">
+                <a14:hiddenLine xmlns="" xmlns:a14="http://schemas.microsoft.com/office/drawing/2010/main" w="9525">
                   <a:solidFill>
                     <a:srgbClr val="000000"/>
                   </a:solidFill>
@@ -4594,7 +4599,7 @@
             </a:ln>
             <a:extLst>
               <a:ext uri="{91240B29-F687-4f45-9708-019B960494DF}">
-                <a14:hiddenLine xmlns:a14="http://schemas.microsoft.com/office/drawing/2010/main" xmlns="" w="9525">
+                <a14:hiddenLine xmlns="" xmlns:a14="http://schemas.microsoft.com/office/drawing/2010/main" w="9525">
                   <a:solidFill>
                     <a:srgbClr val="000000"/>
                   </a:solidFill>
@@ -4684,7 +4689,7 @@
             </a:ln>
             <a:extLst>
               <a:ext uri="{91240B29-F687-4f45-9708-019B960494DF}">
-                <a14:hiddenLine xmlns:a14="http://schemas.microsoft.com/office/drawing/2010/main" xmlns="" w="9525">
+                <a14:hiddenLine xmlns="" xmlns:a14="http://schemas.microsoft.com/office/drawing/2010/main" w="9525">
                   <a:solidFill>
                     <a:srgbClr val="000000"/>
                   </a:solidFill>
@@ -9406,7 +9411,7 @@
           <a:noFill/>
           <a:extLst>
             <a:ext uri="{909E8E84-426E-40dd-AFC4-6F175D3DCCD1}">
-              <a14:hiddenFill xmlns:a14="http://schemas.microsoft.com/office/drawing/2010/main" xmlns="">
+              <a14:hiddenFill xmlns="" xmlns:a14="http://schemas.microsoft.com/office/drawing/2010/main">
                 <a:solidFill>
                   <a:srgbClr val="FFFFFF"/>
                 </a:solidFill>
@@ -9480,7 +9485,7 @@
               </a:ln>
               <a:extLst>
                 <a:ext uri="{91240B29-F687-4f45-9708-019B960494DF}">
-                  <a14:hiddenLine xmlns:a14="http://schemas.microsoft.com/office/drawing/2010/main" xmlns="" w="9525">
+                  <a14:hiddenLine xmlns="" xmlns:a14="http://schemas.microsoft.com/office/drawing/2010/main" w="9525">
                     <a:solidFill>
                       <a:srgbClr val="000000"/>
                     </a:solidFill>
@@ -9570,7 +9575,7 @@
               </a:ln>
               <a:extLst>
                 <a:ext uri="{91240B29-F687-4f45-9708-019B960494DF}">
-                  <a14:hiddenLine xmlns:a14="http://schemas.microsoft.com/office/drawing/2010/main" xmlns="" w="9525">
+                  <a14:hiddenLine xmlns="" xmlns:a14="http://schemas.microsoft.com/office/drawing/2010/main" w="9525">
                     <a:solidFill>
                       <a:srgbClr val="000000"/>
                     </a:solidFill>
@@ -9660,7 +9665,7 @@
               </a:ln>
               <a:extLst>
                 <a:ext uri="{91240B29-F687-4f45-9708-019B960494DF}">
-                  <a14:hiddenLine xmlns:a14="http://schemas.microsoft.com/office/drawing/2010/main" xmlns="" w="9525">
+                  <a14:hiddenLine xmlns="" xmlns:a14="http://schemas.microsoft.com/office/drawing/2010/main" w="9525">
                     <a:solidFill>
                       <a:srgbClr val="000000"/>
                     </a:solidFill>
@@ -9722,7 +9727,7 @@
               </a:ln>
               <a:extLst>
                 <a:ext uri="{91240B29-F687-4f45-9708-019B960494DF}">
-                  <a14:hiddenLine xmlns:a14="http://schemas.microsoft.com/office/drawing/2010/main" xmlns="" w="9525">
+                  <a14:hiddenLine xmlns="" xmlns:a14="http://schemas.microsoft.com/office/drawing/2010/main" w="9525">
                     <a:solidFill>
                       <a:srgbClr val="000000"/>
                     </a:solidFill>
@@ -9812,7 +9817,7 @@
               </a:ln>
               <a:extLst>
                 <a:ext uri="{91240B29-F687-4f45-9708-019B960494DF}">
-                  <a14:hiddenLine xmlns:a14="http://schemas.microsoft.com/office/drawing/2010/main" xmlns="" w="9525">
+                  <a14:hiddenLine xmlns="" xmlns:a14="http://schemas.microsoft.com/office/drawing/2010/main" w="9525">
                     <a:solidFill>
                       <a:srgbClr val="000000"/>
                     </a:solidFill>
@@ -9874,7 +9879,7 @@
               </a:ln>
               <a:extLst>
                 <a:ext uri="{91240B29-F687-4f45-9708-019B960494DF}">
-                  <a14:hiddenLine xmlns:a14="http://schemas.microsoft.com/office/drawing/2010/main" xmlns="" w="9525">
+                  <a14:hiddenLine xmlns="" xmlns:a14="http://schemas.microsoft.com/office/drawing/2010/main" w="9525">
                     <a:solidFill>
                       <a:srgbClr val="000000"/>
                     </a:solidFill>
@@ -9936,7 +9941,7 @@
               </a:ln>
               <a:extLst>
                 <a:ext uri="{91240B29-F687-4f45-9708-019B960494DF}">
-                  <a14:hiddenLine xmlns:a14="http://schemas.microsoft.com/office/drawing/2010/main" xmlns="" w="9525">
+                  <a14:hiddenLine xmlns="" xmlns:a14="http://schemas.microsoft.com/office/drawing/2010/main" w="9525">
                     <a:solidFill>
                       <a:srgbClr val="000000"/>
                     </a:solidFill>
@@ -10026,7 +10031,7 @@
               </a:ln>
               <a:extLst>
                 <a:ext uri="{91240B29-F687-4f45-9708-019B960494DF}">
-                  <a14:hiddenLine xmlns:a14="http://schemas.microsoft.com/office/drawing/2010/main" xmlns="" w="9525">
+                  <a14:hiddenLine xmlns="" xmlns:a14="http://schemas.microsoft.com/office/drawing/2010/main" w="9525">
                     <a:solidFill>
                       <a:srgbClr val="000000"/>
                     </a:solidFill>
@@ -10116,7 +10121,7 @@
               </a:ln>
               <a:extLst>
                 <a:ext uri="{91240B29-F687-4f45-9708-019B960494DF}">
-                  <a14:hiddenLine xmlns:a14="http://schemas.microsoft.com/office/drawing/2010/main" xmlns="" w="9525">
+                  <a14:hiddenLine xmlns="" xmlns:a14="http://schemas.microsoft.com/office/drawing/2010/main" w="9525">
                     <a:solidFill>
                       <a:srgbClr val="000000"/>
                     </a:solidFill>
@@ -10178,7 +10183,7 @@
               </a:ln>
               <a:extLst>
                 <a:ext uri="{91240B29-F687-4f45-9708-019B960494DF}">
-                  <a14:hiddenLine xmlns:a14="http://schemas.microsoft.com/office/drawing/2010/main" xmlns="" w="9525">
+                  <a14:hiddenLine xmlns="" xmlns:a14="http://schemas.microsoft.com/office/drawing/2010/main" w="9525">
                     <a:solidFill>
                       <a:srgbClr val="000000"/>
                     </a:solidFill>
@@ -10288,7 +10293,7 @@
               </a:ln>
               <a:extLst>
                 <a:ext uri="{91240B29-F687-4f45-9708-019B960494DF}">
-                  <a14:hiddenLine xmlns:a14="http://schemas.microsoft.com/office/drawing/2010/main" xmlns="" w="9525">
+                  <a14:hiddenLine xmlns="" xmlns:a14="http://schemas.microsoft.com/office/drawing/2010/main" w="9525">
                     <a:solidFill>
                       <a:srgbClr val="000000"/>
                     </a:solidFill>
@@ -10372,7 +10377,7 @@
               </a:ln>
               <a:extLst>
                 <a:ext uri="{91240B29-F687-4f45-9708-019B960494DF}">
-                  <a14:hiddenLine xmlns:a14="http://schemas.microsoft.com/office/drawing/2010/main" xmlns="" w="9525">
+                  <a14:hiddenLine xmlns="" xmlns:a14="http://schemas.microsoft.com/office/drawing/2010/main" w="9525">
                     <a:solidFill>
                       <a:srgbClr val="000000"/>
                     </a:solidFill>
@@ -10434,7 +10439,7 @@
               </a:ln>
               <a:extLst>
                 <a:ext uri="{91240B29-F687-4f45-9708-019B960494DF}">
-                  <a14:hiddenLine xmlns:a14="http://schemas.microsoft.com/office/drawing/2010/main" xmlns="" w="9525">
+                  <a14:hiddenLine xmlns="" xmlns:a14="http://schemas.microsoft.com/office/drawing/2010/main" w="9525">
                     <a:solidFill>
                       <a:srgbClr val="000000"/>
                     </a:solidFill>
@@ -10496,7 +10501,7 @@
               </a:ln>
               <a:extLst>
                 <a:ext uri="{91240B29-F687-4f45-9708-019B960494DF}">
-                  <a14:hiddenLine xmlns:a14="http://schemas.microsoft.com/office/drawing/2010/main" xmlns="" w="9525">
+                  <a14:hiddenLine xmlns="" xmlns:a14="http://schemas.microsoft.com/office/drawing/2010/main" w="9525">
                     <a:solidFill>
                       <a:srgbClr val="000000"/>
                     </a:solidFill>
@@ -10586,7 +10591,7 @@
               </a:ln>
               <a:extLst>
                 <a:ext uri="{91240B29-F687-4f45-9708-019B960494DF}">
-                  <a14:hiddenLine xmlns:a14="http://schemas.microsoft.com/office/drawing/2010/main" xmlns="" w="9525">
+                  <a14:hiddenLine xmlns="" xmlns:a14="http://schemas.microsoft.com/office/drawing/2010/main" w="9525">
                     <a:solidFill>
                       <a:srgbClr val="000000"/>
                     </a:solidFill>
@@ -10620,7 +10625,7 @@
               </a:ln>
               <a:extLst>
                 <a:ext uri="{91240B29-F687-4f45-9708-019B960494DF}">
-                  <a14:hiddenLine xmlns:a14="http://schemas.microsoft.com/office/drawing/2010/main" xmlns="" w="9525">
+                  <a14:hiddenLine xmlns="" xmlns:a14="http://schemas.microsoft.com/office/drawing/2010/main" w="9525">
                     <a:solidFill>
                       <a:srgbClr val="000000"/>
                     </a:solidFill>
@@ -10685,7 +10690,7 @@
               </a:ln>
               <a:extLst>
                 <a:ext uri="{91240B29-F687-4f45-9708-019B960494DF}">
-                  <a14:hiddenLine xmlns:a14="http://schemas.microsoft.com/office/drawing/2010/main" xmlns="" w="9525">
+                  <a14:hiddenLine xmlns="" xmlns:a14="http://schemas.microsoft.com/office/drawing/2010/main" w="9525">
                     <a:solidFill>
                       <a:srgbClr val="000000"/>
                     </a:solidFill>
@@ -10775,7 +10780,7 @@
               </a:ln>
               <a:extLst>
                 <a:ext uri="{91240B29-F687-4f45-9708-019B960494DF}">
-                  <a14:hiddenLine xmlns:a14="http://schemas.microsoft.com/office/drawing/2010/main" xmlns="" w="9525">
+                  <a14:hiddenLine xmlns="" xmlns:a14="http://schemas.microsoft.com/office/drawing/2010/main" w="9525">
                     <a:solidFill>
                       <a:srgbClr val="000000"/>
                     </a:solidFill>
@@ -10837,7 +10842,7 @@
               </a:ln>
               <a:extLst>
                 <a:ext uri="{91240B29-F687-4f45-9708-019B960494DF}">
-                  <a14:hiddenLine xmlns:a14="http://schemas.microsoft.com/office/drawing/2010/main" xmlns="" w="9525">
+                  <a14:hiddenLine xmlns="" xmlns:a14="http://schemas.microsoft.com/office/drawing/2010/main" w="9525">
                     <a:solidFill>
                       <a:srgbClr val="000000"/>
                     </a:solidFill>
@@ -10927,7 +10932,7 @@
               </a:ln>
               <a:extLst>
                 <a:ext uri="{91240B29-F687-4f45-9708-019B960494DF}">
-                  <a14:hiddenLine xmlns:a14="http://schemas.microsoft.com/office/drawing/2010/main" xmlns="" w="9525">
+                  <a14:hiddenLine xmlns="" xmlns:a14="http://schemas.microsoft.com/office/drawing/2010/main" w="9525">
                     <a:solidFill>
                       <a:srgbClr val="000000"/>
                     </a:solidFill>
@@ -10992,7 +10997,7 @@
               </a:ln>
               <a:extLst>
                 <a:ext uri="{91240B29-F687-4f45-9708-019B960494DF}">
-                  <a14:hiddenLine xmlns:a14="http://schemas.microsoft.com/office/drawing/2010/main" xmlns="" w="9525">
+                  <a14:hiddenLine xmlns="" xmlns:a14="http://schemas.microsoft.com/office/drawing/2010/main" w="9525">
                     <a:solidFill>
                       <a:srgbClr val="000000"/>
                     </a:solidFill>
@@ -11054,7 +11059,7 @@
               </a:ln>
               <a:extLst>
                 <a:ext uri="{91240B29-F687-4f45-9708-019B960494DF}">
-                  <a14:hiddenLine xmlns:a14="http://schemas.microsoft.com/office/drawing/2010/main" xmlns="" w="9525">
+                  <a14:hiddenLine xmlns="" xmlns:a14="http://schemas.microsoft.com/office/drawing/2010/main" w="9525">
                     <a:solidFill>
                       <a:srgbClr val="000000"/>
                     </a:solidFill>
@@ -11144,7 +11149,7 @@
               </a:ln>
               <a:extLst>
                 <a:ext uri="{91240B29-F687-4f45-9708-019B960494DF}">
-                  <a14:hiddenLine xmlns:a14="http://schemas.microsoft.com/office/drawing/2010/main" xmlns="" w="9525">
+                  <a14:hiddenLine xmlns="" xmlns:a14="http://schemas.microsoft.com/office/drawing/2010/main" w="9525">
                     <a:solidFill>
                       <a:srgbClr val="000000"/>
                     </a:solidFill>
@@ -11234,7 +11239,7 @@
               </a:ln>
               <a:extLst>
                 <a:ext uri="{91240B29-F687-4f45-9708-019B960494DF}">
-                  <a14:hiddenLine xmlns:a14="http://schemas.microsoft.com/office/drawing/2010/main" xmlns="" w="9525">
+                  <a14:hiddenLine xmlns="" xmlns:a14="http://schemas.microsoft.com/office/drawing/2010/main" w="9525">
                     <a:solidFill>
                       <a:srgbClr val="000000"/>
                     </a:solidFill>
@@ -11299,7 +11304,7 @@
               </a:ln>
               <a:extLst>
                 <a:ext uri="{91240B29-F687-4f45-9708-019B960494DF}">
-                  <a14:hiddenLine xmlns:a14="http://schemas.microsoft.com/office/drawing/2010/main" xmlns="" w="9525">
+                  <a14:hiddenLine xmlns="" xmlns:a14="http://schemas.microsoft.com/office/drawing/2010/main" w="9525">
                     <a:solidFill>
                       <a:srgbClr val="000000"/>
                     </a:solidFill>
@@ -11419,7 +11424,7 @@
               </a:ln>
               <a:extLst>
                 <a:ext uri="{91240B29-F687-4f45-9708-019B960494DF}">
-                  <a14:hiddenLine xmlns:a14="http://schemas.microsoft.com/office/drawing/2010/main" xmlns="" w="9525">
+                  <a14:hiddenLine xmlns="" xmlns:a14="http://schemas.microsoft.com/office/drawing/2010/main" w="9525">
                     <a:solidFill>
                       <a:srgbClr val="000000"/>
                     </a:solidFill>
@@ -11517,7 +11522,7 @@
               </a:ln>
               <a:extLst>
                 <a:ext uri="{91240B29-F687-4f45-9708-019B960494DF}">
-                  <a14:hiddenLine xmlns:a14="http://schemas.microsoft.com/office/drawing/2010/main" xmlns="" w="9525">
+                  <a14:hiddenLine xmlns="" xmlns:a14="http://schemas.microsoft.com/office/drawing/2010/main" w="9525">
                     <a:solidFill>
                       <a:srgbClr val="000000"/>
                     </a:solidFill>
@@ -11632,7 +11637,7 @@
               </a:ln>
               <a:extLst>
                 <a:ext uri="{91240B29-F687-4f45-9708-019B960494DF}">
-                  <a14:hiddenLine xmlns:a14="http://schemas.microsoft.com/office/drawing/2010/main" xmlns="" w="9525">
+                  <a14:hiddenLine xmlns="" xmlns:a14="http://schemas.microsoft.com/office/drawing/2010/main" w="9525">
                     <a:solidFill>
                       <a:srgbClr val="000000"/>
                     </a:solidFill>
@@ -11722,7 +11727,7 @@
               </a:ln>
               <a:extLst>
                 <a:ext uri="{91240B29-F687-4f45-9708-019B960494DF}">
-                  <a14:hiddenLine xmlns:a14="http://schemas.microsoft.com/office/drawing/2010/main" xmlns="" w="9525">
+                  <a14:hiddenLine xmlns="" xmlns:a14="http://schemas.microsoft.com/office/drawing/2010/main" w="9525">
                     <a:solidFill>
                       <a:srgbClr val="000000"/>
                     </a:solidFill>
@@ -11787,7 +11792,7 @@
               </a:ln>
               <a:extLst>
                 <a:ext uri="{91240B29-F687-4f45-9708-019B960494DF}">
-                  <a14:hiddenLine xmlns:a14="http://schemas.microsoft.com/office/drawing/2010/main" xmlns="" w="9525">
+                  <a14:hiddenLine xmlns="" xmlns:a14="http://schemas.microsoft.com/office/drawing/2010/main" w="9525">
                     <a:solidFill>
                       <a:srgbClr val="000000"/>
                     </a:solidFill>
@@ -11877,7 +11882,7 @@
               </a:ln>
               <a:extLst>
                 <a:ext uri="{91240B29-F687-4f45-9708-019B960494DF}">
-                  <a14:hiddenLine xmlns:a14="http://schemas.microsoft.com/office/drawing/2010/main" xmlns="" w="9525">
+                  <a14:hiddenLine xmlns="" xmlns:a14="http://schemas.microsoft.com/office/drawing/2010/main" w="9525">
                     <a:solidFill>
                       <a:srgbClr val="000000"/>
                     </a:solidFill>
@@ -11945,7 +11950,7 @@
               </a:ln>
               <a:extLst>
                 <a:ext uri="{91240B29-F687-4f45-9708-019B960494DF}">
-                  <a14:hiddenLine xmlns:a14="http://schemas.microsoft.com/office/drawing/2010/main" xmlns="" w="9525">
+                  <a14:hiddenLine xmlns="" xmlns:a14="http://schemas.microsoft.com/office/drawing/2010/main" w="9525">
                     <a:solidFill>
                       <a:srgbClr val="000000"/>
                     </a:solidFill>
@@ -12035,7 +12040,7 @@
               </a:ln>
               <a:extLst>
                 <a:ext uri="{91240B29-F687-4f45-9708-019B960494DF}">
-                  <a14:hiddenLine xmlns:a14="http://schemas.microsoft.com/office/drawing/2010/main" xmlns="" w="9525">
+                  <a14:hiddenLine xmlns="" xmlns:a14="http://schemas.microsoft.com/office/drawing/2010/main" w="9525">
                     <a:solidFill>
                       <a:srgbClr val="000000"/>
                     </a:solidFill>
@@ -12103,7 +12108,7 @@
               </a:ln>
               <a:extLst>
                 <a:ext uri="{91240B29-F687-4f45-9708-019B960494DF}">
-                  <a14:hiddenLine xmlns:a14="http://schemas.microsoft.com/office/drawing/2010/main" xmlns="" w="9525">
+                  <a14:hiddenLine xmlns="" xmlns:a14="http://schemas.microsoft.com/office/drawing/2010/main" w="9525">
                     <a:solidFill>
                       <a:srgbClr val="000000"/>
                     </a:solidFill>
@@ -12193,7 +12198,7 @@
               </a:ln>
               <a:extLst>
                 <a:ext uri="{91240B29-F687-4f45-9708-019B960494DF}">
-                  <a14:hiddenLine xmlns:a14="http://schemas.microsoft.com/office/drawing/2010/main" xmlns="" w="9525">
+                  <a14:hiddenLine xmlns="" xmlns:a14="http://schemas.microsoft.com/office/drawing/2010/main" w="9525">
                     <a:solidFill>
                       <a:srgbClr val="000000"/>
                     </a:solidFill>
@@ -12227,7 +12232,7 @@
               </a:ln>
               <a:extLst>
                 <a:ext uri="{91240B29-F687-4f45-9708-019B960494DF}">
-                  <a14:hiddenLine xmlns:a14="http://schemas.microsoft.com/office/drawing/2010/main" xmlns="" w="9525">
+                  <a14:hiddenLine xmlns="" xmlns:a14="http://schemas.microsoft.com/office/drawing/2010/main" w="9525">
                     <a:solidFill>
                       <a:srgbClr val="000000"/>
                     </a:solidFill>
@@ -12805,7 +12810,6 @@
               <a:rPr lang="en-US" dirty="0"/>
               <a:t>A Real-Time Serial Port Visualization Tool created with Python and other open-source tools</a:t>
             </a:r>
-            <a:endParaRPr lang="en-US" dirty="0"/>
           </a:p>
         </p:txBody>
       </p:sp>
@@ -13740,6 +13744,86 @@
               <a:t>5</a:t>
             </a:fld>
             <a:endParaRPr lang="en-US" dirty="0"/>
+          </a:p>
+        </p:txBody>
+      </p:sp>
+      <p:sp>
+        <p:nvSpPr>
+          <p:cNvPr id="9" name="TextBox 8"/>
+          <p:cNvSpPr txBox="1"/>
+          <p:nvPr/>
+        </p:nvSpPr>
+        <p:spPr>
+          <a:xfrm>
+            <a:off x="1484217" y="6065836"/>
+            <a:ext cx="9375965" cy="646331"/>
+          </a:xfrm>
+          <a:prstGeom prst="rect">
+            <a:avLst/>
+          </a:prstGeom>
+          <a:noFill/>
+        </p:spPr>
+        <p:txBody>
+          <a:bodyPr wrap="none" rtlCol="0">
+            <a:spAutoFit/>
+          </a:bodyPr>
+          <a:lstStyle/>
+          <a:p>
+            <a:r>
+              <a:rPr lang="en-US" smtClean="0">
+                <a:solidFill>
+                  <a:srgbClr val="FF0000"/>
+                </a:solidFill>
+              </a:rPr>
+              <a:t>THESE SLIDES CAN </a:t>
+            </a:r>
+            <a:r>
+              <a:rPr lang="en-US" dirty="0">
+                <a:solidFill>
+                  <a:srgbClr val="FF0000"/>
+                </a:solidFill>
+              </a:rPr>
+              <a:t>BE </a:t>
+            </a:r>
+            <a:r>
+              <a:rPr lang="en-US" dirty="0" smtClean="0">
+                <a:solidFill>
+                  <a:srgbClr val="FF0000"/>
+                </a:solidFill>
+              </a:rPr>
+              <a:t>FOUND HERE:</a:t>
+            </a:r>
+            <a:r>
+              <a:rPr lang="en-US" dirty="0">
+                <a:solidFill>
+                  <a:srgbClr val="FF0000"/>
+                </a:solidFill>
+              </a:rPr>
+              <a:t/>
+            </a:r>
+            <a:br>
+              <a:rPr lang="en-US" dirty="0">
+                <a:solidFill>
+                  <a:srgbClr val="FF0000"/>
+                </a:solidFill>
+              </a:rPr>
+            </a:br>
+            <a:r>
+              <a:rPr lang="en-US" dirty="0">
+                <a:solidFill>
+                  <a:srgbClr val="FF0000"/>
+                </a:solidFill>
+              </a:rPr>
+              <a:t>https://</a:t>
+            </a:r>
+            <a:r>
+              <a:rPr lang="en-US" b="1" dirty="0">
+                <a:solidFill>
+                  <a:srgbClr val="FF0000"/>
+                </a:solidFill>
+              </a:rPr>
+              <a:t>github.com/NOAA-PMEL/EDD-SerialVisualizer/tree/master/Documentation/Presentations</a:t>
+            </a:r>
           </a:p>
         </p:txBody>
       </p:sp>

</xml_diff>